<commit_message>
Fix schema with latest ingress update
</commit_message>
<xml_diff>
--- a/eks/images/eks-schema.pptx
+++ b/eks/images/eks-schema.pptx
@@ -261,7 +261,7 @@
           <a:p>
             <a:fld id="{D5A6F0DD-75B4-8A42-956F-738417DABF81}" type="datetimeFigureOut">
               <a:rPr lang="en-FR" smtClean="0"/>
-              <a:t>09/04/2020</a:t>
+              <a:t>01/12/2021</a:t>
             </a:fld>
             <a:endParaRPr lang="en-FR"/>
           </a:p>
@@ -461,7 +461,7 @@
           <a:p>
             <a:fld id="{D5A6F0DD-75B4-8A42-956F-738417DABF81}" type="datetimeFigureOut">
               <a:rPr lang="en-FR" smtClean="0"/>
-              <a:t>09/04/2020</a:t>
+              <a:t>01/12/2021</a:t>
             </a:fld>
             <a:endParaRPr lang="en-FR"/>
           </a:p>
@@ -671,7 +671,7 @@
           <a:p>
             <a:fld id="{D5A6F0DD-75B4-8A42-956F-738417DABF81}" type="datetimeFigureOut">
               <a:rPr lang="en-FR" smtClean="0"/>
-              <a:t>09/04/2020</a:t>
+              <a:t>01/12/2021</a:t>
             </a:fld>
             <a:endParaRPr lang="en-FR"/>
           </a:p>
@@ -871,7 +871,7 @@
           <a:p>
             <a:fld id="{D5A6F0DD-75B4-8A42-956F-738417DABF81}" type="datetimeFigureOut">
               <a:rPr lang="en-FR" smtClean="0"/>
-              <a:t>09/04/2020</a:t>
+              <a:t>01/12/2021</a:t>
             </a:fld>
             <a:endParaRPr lang="en-FR"/>
           </a:p>
@@ -1147,7 +1147,7 @@
           <a:p>
             <a:fld id="{D5A6F0DD-75B4-8A42-956F-738417DABF81}" type="datetimeFigureOut">
               <a:rPr lang="en-FR" smtClean="0"/>
-              <a:t>09/04/2020</a:t>
+              <a:t>01/12/2021</a:t>
             </a:fld>
             <a:endParaRPr lang="en-FR"/>
           </a:p>
@@ -1415,7 +1415,7 @@
           <a:p>
             <a:fld id="{D5A6F0DD-75B4-8A42-956F-738417DABF81}" type="datetimeFigureOut">
               <a:rPr lang="en-FR" smtClean="0"/>
-              <a:t>09/04/2020</a:t>
+              <a:t>01/12/2021</a:t>
             </a:fld>
             <a:endParaRPr lang="en-FR"/>
           </a:p>
@@ -1830,7 +1830,7 @@
           <a:p>
             <a:fld id="{D5A6F0DD-75B4-8A42-956F-738417DABF81}" type="datetimeFigureOut">
               <a:rPr lang="en-FR" smtClean="0"/>
-              <a:t>09/04/2020</a:t>
+              <a:t>01/12/2021</a:t>
             </a:fld>
             <a:endParaRPr lang="en-FR"/>
           </a:p>
@@ -1972,7 +1972,7 @@
           <a:p>
             <a:fld id="{D5A6F0DD-75B4-8A42-956F-738417DABF81}" type="datetimeFigureOut">
               <a:rPr lang="en-FR" smtClean="0"/>
-              <a:t>09/04/2020</a:t>
+              <a:t>01/12/2021</a:t>
             </a:fld>
             <a:endParaRPr lang="en-FR"/>
           </a:p>
@@ -2085,7 +2085,7 @@
           <a:p>
             <a:fld id="{D5A6F0DD-75B4-8A42-956F-738417DABF81}" type="datetimeFigureOut">
               <a:rPr lang="en-FR" smtClean="0"/>
-              <a:t>09/04/2020</a:t>
+              <a:t>01/12/2021</a:t>
             </a:fld>
             <a:endParaRPr lang="en-FR"/>
           </a:p>
@@ -2398,7 +2398,7 @@
           <a:p>
             <a:fld id="{D5A6F0DD-75B4-8A42-956F-738417DABF81}" type="datetimeFigureOut">
               <a:rPr lang="en-FR" smtClean="0"/>
-              <a:t>09/04/2020</a:t>
+              <a:t>01/12/2021</a:t>
             </a:fld>
             <a:endParaRPr lang="en-FR"/>
           </a:p>
@@ -2687,7 +2687,7 @@
           <a:p>
             <a:fld id="{D5A6F0DD-75B4-8A42-956F-738417DABF81}" type="datetimeFigureOut">
               <a:rPr lang="en-FR" smtClean="0"/>
-              <a:t>09/04/2020</a:t>
+              <a:t>01/12/2021</a:t>
             </a:fld>
             <a:endParaRPr lang="en-FR"/>
           </a:p>
@@ -2930,7 +2930,7 @@
           <a:p>
             <a:fld id="{D5A6F0DD-75B4-8A42-956F-738417DABF81}" type="datetimeFigureOut">
               <a:rPr lang="en-FR" smtClean="0"/>
-              <a:t>09/04/2020</a:t>
+              <a:t>01/12/2021</a:t>
             </a:fld>
             <a:endParaRPr lang="en-FR"/>
           </a:p>
@@ -5593,128 +5593,6 @@
           </p:txBody>
         </p:sp>
       </p:grpSp>
-      <p:grpSp>
-        <p:nvGrpSpPr>
-          <p:cNvPr id="137" name="Group 136">
-            <a:extLst>
-              <a:ext uri="{FF2B5EF4-FFF2-40B4-BE49-F238E27FC236}">
-                <a16:creationId xmlns:a16="http://schemas.microsoft.com/office/drawing/2014/main" id="{767DE363-3ED9-334D-B148-944517911CEE}"/>
-              </a:ext>
-            </a:extLst>
-          </p:cNvPr>
-          <p:cNvGrpSpPr/>
-          <p:nvPr/>
-        </p:nvGrpSpPr>
-        <p:grpSpPr>
-          <a:xfrm>
-            <a:off x="3399445" y="2472023"/>
-            <a:ext cx="1030800" cy="870879"/>
-            <a:chOff x="4834057" y="826748"/>
-            <a:chExt cx="808749" cy="546472"/>
-          </a:xfrm>
-          <a:noFill/>
-        </p:grpSpPr>
-        <p:sp>
-          <p:nvSpPr>
-            <p:cNvPr id="138" name="TextBox 137">
-              <a:extLst>
-                <a:ext uri="{FF2B5EF4-FFF2-40B4-BE49-F238E27FC236}">
-                  <a16:creationId xmlns:a16="http://schemas.microsoft.com/office/drawing/2014/main" id="{FE5F6F3C-B362-374D-B659-F6C4CDCAB69C}"/>
-                </a:ext>
-              </a:extLst>
-            </p:cNvPr>
-            <p:cNvSpPr txBox="1"/>
-            <p:nvPr/>
-          </p:nvSpPr>
-          <p:spPr>
-            <a:xfrm>
-              <a:off x="4852498" y="892959"/>
-              <a:ext cx="762324" cy="159331"/>
-            </a:xfrm>
-            <a:prstGeom prst="rect">
-              <a:avLst/>
-            </a:prstGeom>
-            <a:grpFill/>
-            <a:ln>
-              <a:solidFill>
-                <a:schemeClr val="bg1"/>
-              </a:solidFill>
-            </a:ln>
-          </p:spPr>
-          <p:style>
-            <a:lnRef idx="2">
-              <a:schemeClr val="accent2"/>
-            </a:lnRef>
-            <a:fillRef idx="1">
-              <a:schemeClr val="lt1"/>
-            </a:fillRef>
-            <a:effectRef idx="0">
-              <a:schemeClr val="accent2"/>
-            </a:effectRef>
-            <a:fontRef idx="minor">
-              <a:schemeClr val="dk1"/>
-            </a:fontRef>
-          </p:style>
-          <p:txBody>
-            <a:bodyPr wrap="square" rtlCol="0">
-              <a:spAutoFit/>
-            </a:bodyPr>
-            <a:lstStyle/>
-            <a:p>
-              <a:r>
-                <a:rPr lang="en-FR" sz="1050" dirty="0"/>
-                <a:t>SSL Redirect</a:t>
-              </a:r>
-              <a:endParaRPr lang="en-FR" sz="1400" dirty="0"/>
-            </a:p>
-          </p:txBody>
-        </p:sp>
-        <p:sp>
-          <p:nvSpPr>
-            <p:cNvPr id="139" name="Rounded Rectangle 138">
-              <a:extLst>
-                <a:ext uri="{FF2B5EF4-FFF2-40B4-BE49-F238E27FC236}">
-                  <a16:creationId xmlns:a16="http://schemas.microsoft.com/office/drawing/2014/main" id="{0BB90432-63D4-C34A-9BB8-0338D5911958}"/>
-                </a:ext>
-              </a:extLst>
-            </p:cNvPr>
-            <p:cNvSpPr/>
-            <p:nvPr/>
-          </p:nvSpPr>
-          <p:spPr>
-            <a:xfrm>
-              <a:off x="4834057" y="826748"/>
-              <a:ext cx="808749" cy="546472"/>
-            </a:xfrm>
-            <a:prstGeom prst="roundRect">
-              <a:avLst/>
-            </a:prstGeom>
-            <a:grpFill/>
-          </p:spPr>
-          <p:style>
-            <a:lnRef idx="2">
-              <a:schemeClr val="accent2"/>
-            </a:lnRef>
-            <a:fillRef idx="1">
-              <a:schemeClr val="lt1"/>
-            </a:fillRef>
-            <a:effectRef idx="0">
-              <a:schemeClr val="accent2"/>
-            </a:effectRef>
-            <a:fontRef idx="minor">
-              <a:schemeClr val="dk1"/>
-            </a:fontRef>
-          </p:style>
-          <p:txBody>
-            <a:bodyPr rtlCol="0" anchor="ctr"/>
-            <a:lstStyle/>
-            <a:p>
-              <a:pPr algn="ctr"/>
-              <a:endParaRPr lang="en-FR" dirty="0"/>
-            </a:p>
-          </p:txBody>
-        </p:sp>
-      </p:grpSp>
       <p:sp>
         <p:nvSpPr>
           <p:cNvPr id="4" name="Cloud 3">
@@ -5791,8 +5669,8 @@
         </p:nvGrpSpPr>
         <p:grpSpPr>
           <a:xfrm>
-            <a:off x="1837501" y="2261696"/>
-            <a:ext cx="1252476" cy="1200165"/>
+            <a:off x="1898497" y="2428402"/>
+            <a:ext cx="1386835" cy="1010415"/>
             <a:chOff x="1851405" y="2322890"/>
             <a:chExt cx="1252476" cy="1200165"/>
           </a:xfrm>
@@ -5841,61 +5719,6 @@
               <a:r>
                 <a:rPr lang="en-FR" dirty="0"/>
                 <a:t>ALB</a:t>
-              </a:r>
-            </a:p>
-          </p:txBody>
-        </p:sp>
-        <p:sp>
-          <p:nvSpPr>
-            <p:cNvPr id="9" name="Round Diagonal Corner of Rectangle 8">
-              <a:extLst>
-                <a:ext uri="{FF2B5EF4-FFF2-40B4-BE49-F238E27FC236}">
-                  <a16:creationId xmlns:a16="http://schemas.microsoft.com/office/drawing/2014/main" id="{C536510B-9D60-6A43-BFDB-774164B7BA7F}"/>
-                </a:ext>
-              </a:extLst>
-            </p:cNvPr>
-            <p:cNvSpPr/>
-            <p:nvPr/>
-          </p:nvSpPr>
-          <p:spPr>
-            <a:xfrm>
-              <a:off x="2032748" y="3055346"/>
-              <a:ext cx="822975" cy="355258"/>
-            </a:xfrm>
-            <a:prstGeom prst="round2DiagRect">
-              <a:avLst/>
-            </a:prstGeom>
-            <a:solidFill>
-              <a:schemeClr val="accent2">
-                <a:lumMod val="60000"/>
-                <a:lumOff val="40000"/>
-              </a:schemeClr>
-            </a:solidFill>
-          </p:spPr>
-          <p:style>
-            <a:lnRef idx="2">
-              <a:schemeClr val="accent1">
-                <a:shade val="50000"/>
-              </a:schemeClr>
-            </a:lnRef>
-            <a:fillRef idx="1">
-              <a:schemeClr val="accent1"/>
-            </a:fillRef>
-            <a:effectRef idx="0">
-              <a:schemeClr val="accent1"/>
-            </a:effectRef>
-            <a:fontRef idx="minor">
-              <a:schemeClr val="lt1"/>
-            </a:fontRef>
-          </p:style>
-          <p:txBody>
-            <a:bodyPr rtlCol="0" anchor="ctr"/>
-            <a:lstStyle/>
-            <a:p>
-              <a:pPr algn="ctr"/>
-              <a:r>
-                <a:rPr lang="en-FR" dirty="0"/>
-                <a:t>Http</a:t>
               </a:r>
             </a:p>
           </p:txBody>
@@ -5985,8 +5808,8 @@
         </p:blipFill>
         <p:spPr bwMode="auto">
           <a:xfrm flipH="1">
-            <a:off x="3823055" y="2763420"/>
-            <a:ext cx="556320" cy="556320"/>
+            <a:off x="2903870" y="2822969"/>
+            <a:ext cx="324115" cy="324115"/>
           </a:xfrm>
           <a:prstGeom prst="rect">
             <a:avLst/>
@@ -6019,8 +5842,8 @@
         </p:nvCxnSpPr>
         <p:spPr>
           <a:xfrm flipV="1">
-            <a:off x="4379375" y="1478362"/>
-            <a:ext cx="1291081" cy="971486"/>
+            <a:off x="3327494" y="1478362"/>
+            <a:ext cx="2342962" cy="1149442"/>
           </a:xfrm>
           <a:prstGeom prst="straightConnector1">
             <a:avLst/>
@@ -6058,13 +5881,14 @@
           </p:cNvPr>
           <p:cNvCxnSpPr>
             <a:cxnSpLocks/>
+            <a:stCxn id="142" idx="3"/>
           </p:cNvCxnSpPr>
           <p:nvPr/>
         </p:nvCxnSpPr>
         <p:spPr>
           <a:xfrm flipV="1">
-            <a:off x="4479106" y="2597691"/>
-            <a:ext cx="1386720" cy="104016"/>
+            <a:off x="3285332" y="2597692"/>
+            <a:ext cx="2580494" cy="335918"/>
           </a:xfrm>
           <a:prstGeom prst="straightConnector1">
             <a:avLst/>
@@ -6107,8 +5931,8 @@
         </p:nvCxnSpPr>
         <p:spPr>
           <a:xfrm>
-            <a:off x="4479106" y="3143979"/>
-            <a:ext cx="1406141" cy="554713"/>
+            <a:off x="3319486" y="3158020"/>
+            <a:ext cx="2565761" cy="540672"/>
           </a:xfrm>
           <a:prstGeom prst="straightConnector1">
             <a:avLst/>
@@ -6151,8 +5975,8 @@
         </p:nvCxnSpPr>
         <p:spPr>
           <a:xfrm>
-            <a:off x="4296946" y="3429000"/>
-            <a:ext cx="1334882" cy="1314434"/>
+            <a:off x="3334359" y="3311694"/>
+            <a:ext cx="2297469" cy="1431740"/>
           </a:xfrm>
           <a:prstGeom prst="straightConnector1">
             <a:avLst/>
@@ -6194,7 +6018,7 @@
         <p:spPr>
           <a:xfrm>
             <a:off x="3902631" y="1601427"/>
-            <a:ext cx="1584216" cy="276999"/>
+            <a:ext cx="1447960" cy="276999"/>
           </a:xfrm>
           <a:prstGeom prst="rect">
             <a:avLst/>
@@ -6209,7 +6033,7 @@
           <a:p>
             <a:r>
               <a:rPr lang="en-FR" sz="1200" dirty="0"/>
-              <a:t>rule:/decisioncenter/*</a:t>
+              <a:t>rule:/decisioncenter</a:t>
             </a:r>
           </a:p>
         </p:txBody>
@@ -6228,8 +6052,8 @@
         </p:nvSpPr>
         <p:spPr>
           <a:xfrm>
-            <a:off x="4405469" y="3161818"/>
-            <a:ext cx="1651414" cy="276999"/>
+            <a:off x="4451074" y="3222586"/>
+            <a:ext cx="1574470" cy="276999"/>
           </a:xfrm>
           <a:prstGeom prst="rect">
             <a:avLst/>
@@ -6244,7 +6068,7 @@
           <a:p>
             <a:r>
               <a:rPr lang="en-FR" sz="1200" dirty="0"/>
-              <a:t>rule:/DecisionRunner/*</a:t>
+              <a:t>rule:/DecisionRunner</a:t>
             </a:r>
           </a:p>
         </p:txBody>
@@ -6263,8 +6087,8 @@
         </p:nvSpPr>
         <p:spPr>
           <a:xfrm>
-            <a:off x="4670025" y="2337140"/>
-            <a:ext cx="886333" cy="276999"/>
+            <a:off x="4897325" y="2359892"/>
+            <a:ext cx="750077" cy="276999"/>
           </a:xfrm>
           <a:prstGeom prst="rect">
             <a:avLst/>
@@ -6283,7 +6107,7 @@
             </a:r>
             <a:r>
               <a:rPr lang="en-FR" sz="1200" dirty="0"/>
-              <a:t>ule:/res/*</a:t>
+              <a:t>ule:/res</a:t>
             </a:r>
           </a:p>
         </p:txBody>
@@ -6303,7 +6127,7 @@
         <p:spPr>
           <a:xfrm>
             <a:off x="3897292" y="4416270"/>
-            <a:ext cx="1646413" cy="276999"/>
+            <a:ext cx="1569469" cy="276999"/>
           </a:xfrm>
           <a:prstGeom prst="rect">
             <a:avLst/>
@@ -6318,57 +6142,8 @@
           <a:p>
             <a:r>
               <a:rPr lang="en-FR" sz="1200" dirty="0"/>
-              <a:t>rule:/DecisionService/*</a:t>
+              <a:t>rule:/DecisionService</a:t>
             </a:r>
-          </a:p>
-        </p:txBody>
-      </p:sp>
-      <p:sp>
-        <p:nvSpPr>
-          <p:cNvPr id="76" name="Right Arrow 75">
-            <a:extLst>
-              <a:ext uri="{FF2B5EF4-FFF2-40B4-BE49-F238E27FC236}">
-                <a16:creationId xmlns:a16="http://schemas.microsoft.com/office/drawing/2014/main" id="{92BA8462-5532-A347-9AF3-3DFF06AF55EC}"/>
-              </a:ext>
-            </a:extLst>
-          </p:cNvPr>
-          <p:cNvSpPr/>
-          <p:nvPr/>
-        </p:nvSpPr>
-        <p:spPr>
-          <a:xfrm>
-            <a:off x="3065594" y="2889378"/>
-            <a:ext cx="378590" cy="209547"/>
-          </a:xfrm>
-          <a:prstGeom prst="rightArrow">
-            <a:avLst/>
-          </a:prstGeom>
-          <a:solidFill>
-            <a:schemeClr val="accent2"/>
-          </a:solidFill>
-        </p:spPr>
-        <p:style>
-          <a:lnRef idx="2">
-            <a:schemeClr val="accent1">
-              <a:shade val="50000"/>
-            </a:schemeClr>
-          </a:lnRef>
-          <a:fillRef idx="1">
-            <a:schemeClr val="accent1"/>
-          </a:fillRef>
-          <a:effectRef idx="0">
-            <a:schemeClr val="accent1"/>
-          </a:effectRef>
-          <a:fontRef idx="minor">
-            <a:schemeClr val="lt1"/>
-          </a:fontRef>
-        </p:style>
-        <p:txBody>
-          <a:bodyPr rtlCol="0" anchor="ctr"/>
-          <a:lstStyle/>
-          <a:p>
-            <a:pPr algn="ctr"/>
-            <a:endParaRPr lang="en-FR"/>
           </a:p>
         </p:txBody>
       </p:sp>
@@ -6418,45 +6193,6 @@
           <a:p>
             <a:pPr algn="ctr"/>
             <a:endParaRPr lang="en-FR"/>
-          </a:p>
-        </p:txBody>
-      </p:sp>
-      <p:sp>
-        <p:nvSpPr>
-          <p:cNvPr id="153" name="TextBox 152">
-            <a:extLst>
-              <a:ext uri="{FF2B5EF4-FFF2-40B4-BE49-F238E27FC236}">
-                <a16:creationId xmlns:a16="http://schemas.microsoft.com/office/drawing/2014/main" id="{8043A325-FD63-444A-A699-CFD49F2B94D5}"/>
-              </a:ext>
-            </a:extLst>
-          </p:cNvPr>
-          <p:cNvSpPr txBox="1"/>
-          <p:nvPr/>
-        </p:nvSpPr>
-        <p:spPr>
-          <a:xfrm>
-            <a:off x="2684098" y="2710141"/>
-            <a:ext cx="638316" cy="276999"/>
-          </a:xfrm>
-          <a:prstGeom prst="rect">
-            <a:avLst/>
-          </a:prstGeom>
-          <a:noFill/>
-        </p:spPr>
-        <p:txBody>
-          <a:bodyPr wrap="none" rtlCol="0">
-            <a:spAutoFit/>
-          </a:bodyPr>
-          <a:lstStyle/>
-          <a:p>
-            <a:r>
-              <a:rPr lang="en-GB" sz="1200" dirty="0"/>
-              <a:t>R</a:t>
-            </a:r>
-            <a:r>
-              <a:rPr lang="en-FR" sz="1200" dirty="0"/>
-              <a:t>ule:/*</a:t>
-            </a:r>
           </a:p>
         </p:txBody>
       </p:sp>
@@ -7433,6 +7169,41 @@
           </a:extLst>
         </p:spPr>
       </p:pic>
+      <p:sp>
+        <p:nvSpPr>
+          <p:cNvPr id="93" name="TextBox 92">
+            <a:extLst>
+              <a:ext uri="{FF2B5EF4-FFF2-40B4-BE49-F238E27FC236}">
+                <a16:creationId xmlns:a16="http://schemas.microsoft.com/office/drawing/2014/main" id="{13B0FE47-77FF-4841-B06A-6BC4ED378DC7}"/>
+              </a:ext>
+            </a:extLst>
+          </p:cNvPr>
+          <p:cNvSpPr txBox="1"/>
+          <p:nvPr/>
+        </p:nvSpPr>
+        <p:spPr>
+          <a:xfrm>
+            <a:off x="3894787" y="1862604"/>
+            <a:ext cx="1679114" cy="276999"/>
+          </a:xfrm>
+          <a:prstGeom prst="rect">
+            <a:avLst/>
+          </a:prstGeom>
+          <a:noFill/>
+        </p:spPr>
+        <p:txBody>
+          <a:bodyPr wrap="none" rtlCol="0">
+            <a:spAutoFit/>
+          </a:bodyPr>
+          <a:lstStyle/>
+          <a:p>
+            <a:r>
+              <a:rPr lang="en-FR" sz="1200" dirty="0"/>
+              <a:t>rule:/decisioncenter-api</a:t>
+            </a:r>
+          </a:p>
+        </p:txBody>
+      </p:sp>
     </p:spTree>
     <p:extLst>
       <p:ext uri="{BB962C8B-B14F-4D97-AF65-F5344CB8AC3E}">

</xml_diff>